<commit_message>
update command class diagram
</commit_message>
<xml_diff>
--- a/MeetingMinutes/SimianArmy_RelatedFiles/initialization_command.pptx
+++ b/MeetingMinutes/SimianArmy_RelatedFiles/initialization_command.pptx
@@ -5942,8 +5942,8 @@
         </p:blipFill>
         <p:spPr>
           <a:xfrm>
-            <a:off x="1590282" y="1139253"/>
-            <a:ext cx="6107190" cy="3419340"/>
+            <a:off x="1583740" y="1141397"/>
+            <a:ext cx="6120275" cy="3415051"/>
           </a:xfrm>
           <a:prstGeom prst="rect">
             <a:avLst/>

</xml_diff>